<commit_message>
Minor changes to diagrams
</commit_message>
<xml_diff>
--- a/Figures/MetaModel.pptx
+++ b/Figures/MetaModel.pptx
@@ -3160,11 +3160,20 @@
           <a:prstGeom prst="rect">
             <a:avLst/>
           </a:prstGeom>
-          <a:solidFill>
-            <a:schemeClr val="bg1">
-              <a:lumMod val="85000"/>
-            </a:schemeClr>
-          </a:solidFill>
+          <a:gradFill flip="none" rotWithShape="1">
+            <a:gsLst>
+              <a:gs pos="0">
+                <a:schemeClr val="bg1">
+                  <a:lumMod val="85000"/>
+                </a:schemeClr>
+              </a:gs>
+              <a:gs pos="100000">
+                <a:schemeClr val="bg1"/>
+              </a:gs>
+            </a:gsLst>
+            <a:lin ang="0" scaled="1"/>
+            <a:tileRect/>
+          </a:gradFill>
           <a:ln>
             <a:solidFill>
               <a:schemeClr val="tx1">
@@ -3172,7 +3181,7 @@
                 <a:lumOff val="15000"/>
               </a:schemeClr>
             </a:solidFill>
-            <a:prstDash val="solid"/>
+            <a:prstDash val="dash"/>
           </a:ln>
           <a:effectLst/>
         </p:spPr>
@@ -4649,11 +4658,20 @@
           <a:prstGeom prst="rect">
             <a:avLst/>
           </a:prstGeom>
-          <a:solidFill>
-            <a:schemeClr val="bg1">
-              <a:lumMod val="85000"/>
-            </a:schemeClr>
-          </a:solidFill>
+          <a:gradFill flip="none" rotWithShape="1">
+            <a:gsLst>
+              <a:gs pos="0">
+                <a:schemeClr val="bg1">
+                  <a:lumMod val="85000"/>
+                </a:schemeClr>
+              </a:gs>
+              <a:gs pos="100000">
+                <a:schemeClr val="bg1"/>
+              </a:gs>
+            </a:gsLst>
+            <a:lin ang="0" scaled="1"/>
+            <a:tileRect/>
+          </a:gradFill>
           <a:ln>
             <a:solidFill>
               <a:schemeClr val="tx1">
@@ -4661,6 +4679,7 @@
                 <a:lumOff val="15000"/>
               </a:schemeClr>
             </a:solidFill>
+            <a:prstDash val="dash"/>
           </a:ln>
           <a:effectLst/>
         </p:spPr>
@@ -6094,7 +6113,7 @@
         <p:spPr>
           <a:xfrm>
             <a:off x="3915370" y="2811069"/>
-            <a:ext cx="393632" cy="230832"/>
+            <a:ext cx="438210" cy="230832"/>
           </a:xfrm>
           <a:prstGeom prst="rect">
             <a:avLst/>
@@ -6109,7 +6128,7 @@
           <a:p>
             <a:r>
               <a:rPr lang="en-US" sz="900" dirty="0" smtClean="0"/>
-              <a:t>type</a:t>
+              <a:t>/type</a:t>
             </a:r>
             <a:endParaRPr lang="en-US" sz="900" dirty="0"/>
           </a:p>
@@ -6169,7 +6188,7 @@
         <p:spPr>
           <a:xfrm>
             <a:off x="4067770" y="3725136"/>
-            <a:ext cx="393632" cy="230832"/>
+            <a:ext cx="438210" cy="230832"/>
           </a:xfrm>
           <a:prstGeom prst="rect">
             <a:avLst/>
@@ -6184,7 +6203,7 @@
           <a:p>
             <a:r>
               <a:rPr lang="en-US" sz="900" dirty="0" smtClean="0"/>
-              <a:t>type</a:t>
+              <a:t>/type</a:t>
             </a:r>
             <a:endParaRPr lang="en-US" sz="900" dirty="0"/>
           </a:p>
@@ -6244,7 +6263,7 @@
         <p:spPr>
           <a:xfrm>
             <a:off x="5523090" y="4833972"/>
-            <a:ext cx="438773" cy="230832"/>
+            <a:ext cx="483350" cy="230832"/>
           </a:xfrm>
           <a:prstGeom prst="rect">
             <a:avLst/>
@@ -6259,7 +6278,7 @@
           <a:p>
             <a:r>
               <a:rPr lang="en-US" sz="900" dirty="0" smtClean="0"/>
-              <a:t>types</a:t>
+              <a:t>/types</a:t>
             </a:r>
             <a:endParaRPr lang="en-US" sz="900" dirty="0"/>
           </a:p>
@@ -6319,7 +6338,7 @@
         <p:spPr>
           <a:xfrm>
             <a:off x="5843411" y="5812090"/>
-            <a:ext cx="438773" cy="230832"/>
+            <a:ext cx="483350" cy="230832"/>
           </a:xfrm>
           <a:prstGeom prst="rect">
             <a:avLst/>
@@ -6334,7 +6353,7 @@
           <a:p>
             <a:r>
               <a:rPr lang="en-US" sz="900" dirty="0" smtClean="0"/>
-              <a:t>types</a:t>
+              <a:t>/types</a:t>
             </a:r>
             <a:endParaRPr lang="en-US" sz="900" dirty="0"/>
           </a:p>
@@ -6570,6 +6589,108 @@
         <p:spPr>
           <a:xfrm>
             <a:off x="1663492" y="3933064"/>
+            <a:ext cx="261310" cy="276999"/>
+          </a:xfrm>
+          <a:prstGeom prst="rect">
+            <a:avLst/>
+          </a:prstGeom>
+          <a:noFill/>
+        </p:spPr>
+        <p:txBody>
+          <a:bodyPr wrap="none" rtlCol="0">
+            <a:spAutoFit/>
+          </a:bodyPr>
+          <a:lstStyle/>
+          <a:p>
+            <a:r>
+              <a:rPr lang="en-US" sz="1200" dirty="0" smtClean="0"/>
+              <a:t>*</a:t>
+            </a:r>
+            <a:endParaRPr lang="en-US" sz="1200" dirty="0"/>
+          </a:p>
+        </p:txBody>
+      </p:sp>
+      <p:cxnSp>
+        <p:nvCxnSpPr>
+          <p:cNvPr id="161" name="Connecteur en angle 160"/>
+          <p:cNvCxnSpPr/>
+          <p:nvPr/>
+        </p:nvCxnSpPr>
+        <p:spPr>
+          <a:xfrm rot="10800000">
+            <a:off x="2893992" y="2184400"/>
+            <a:ext cx="4017534" cy="264160"/>
+          </a:xfrm>
+          <a:prstGeom prst="bentConnector3">
+            <a:avLst>
+              <a:gd name="adj1" fmla="val 64415"/>
+            </a:avLst>
+          </a:prstGeom>
+          <a:ln w="12700" cmpd="sng">
+            <a:solidFill>
+              <a:schemeClr val="tx1">
+                <a:lumMod val="85000"/>
+                <a:lumOff val="15000"/>
+              </a:schemeClr>
+            </a:solidFill>
+            <a:tailEnd type="arrow" w="sm" len="med"/>
+          </a:ln>
+          <a:effectLst/>
+        </p:spPr>
+        <p:style>
+          <a:lnRef idx="2">
+            <a:schemeClr val="accent1"/>
+          </a:lnRef>
+          <a:fillRef idx="0">
+            <a:schemeClr val="accent1"/>
+          </a:fillRef>
+          <a:effectRef idx="1">
+            <a:schemeClr val="accent1"/>
+          </a:effectRef>
+          <a:fontRef idx="minor">
+            <a:schemeClr val="tx1"/>
+          </a:fontRef>
+        </p:style>
+      </p:cxnSp>
+      <p:sp>
+        <p:nvSpPr>
+          <p:cNvPr id="165" name="ZoneTexte 164"/>
+          <p:cNvSpPr txBox="1"/>
+          <p:nvPr/>
+        </p:nvSpPr>
+        <p:spPr>
+          <a:xfrm>
+            <a:off x="3423656" y="2156769"/>
+            <a:ext cx="438773" cy="230832"/>
+          </a:xfrm>
+          <a:prstGeom prst="rect">
+            <a:avLst/>
+          </a:prstGeom>
+          <a:noFill/>
+        </p:spPr>
+        <p:txBody>
+          <a:bodyPr wrap="none" rtlCol="0">
+            <a:spAutoFit/>
+          </a:bodyPr>
+          <a:lstStyle/>
+          <a:p>
+            <a:r>
+              <a:rPr lang="en-US" sz="900" dirty="0" smtClean="0"/>
+              <a:t>types</a:t>
+            </a:r>
+            <a:endParaRPr lang="en-US" sz="900" dirty="0"/>
+          </a:p>
+        </p:txBody>
+      </p:sp>
+      <p:sp>
+        <p:nvSpPr>
+          <p:cNvPr id="166" name="ZoneTexte 165"/>
+          <p:cNvSpPr txBox="1"/>
+          <p:nvPr/>
+        </p:nvSpPr>
+        <p:spPr>
+          <a:xfrm>
+            <a:off x="2974411" y="2136208"/>
             <a:ext cx="261310" cy="276999"/>
           </a:xfrm>
           <a:prstGeom prst="rect">

</xml_diff>